<commit_message>
Updated Lectures 7, 8 and 9
</commit_message>
<xml_diff>
--- a/07-Arrays.pptx
+++ b/07-Arrays.pptx
@@ -224,7 +224,7 @@
           <a:p>
             <a:fld id="{1A052DDE-B79B-4585-97B6-DCDE6083B029}" type="datetimeFigureOut">
               <a:rPr lang="bg-BG" smtClean="0"/>
-              <a:t>5.11.2015 г.</a:t>
+              <a:t>8.11.2015 г.</a:t>
             </a:fld>
             <a:endParaRPr lang="bg-BG"/>
           </a:p>
@@ -1009,7 +1009,7 @@
           <a:p>
             <a:fld id="{3EA744D9-3FBE-48D8-BF2A-85DF203E4D20}" type="datetimeFigureOut">
               <a:rPr lang="bg-BG" smtClean="0"/>
-              <a:t>5.11.2015 г.</a:t>
+              <a:t>8.11.2015 г.</a:t>
             </a:fld>
             <a:endParaRPr lang="bg-BG"/>
           </a:p>
@@ -1179,7 +1179,7 @@
           <a:p>
             <a:fld id="{3EA744D9-3FBE-48D8-BF2A-85DF203E4D20}" type="datetimeFigureOut">
               <a:rPr lang="bg-BG" smtClean="0"/>
-              <a:t>5.11.2015 г.</a:t>
+              <a:t>8.11.2015 г.</a:t>
             </a:fld>
             <a:endParaRPr lang="bg-BG"/>
           </a:p>
@@ -1359,7 +1359,7 @@
           <a:p>
             <a:fld id="{3EA744D9-3FBE-48D8-BF2A-85DF203E4D20}" type="datetimeFigureOut">
               <a:rPr lang="bg-BG" smtClean="0"/>
-              <a:t>5.11.2015 г.</a:t>
+              <a:t>8.11.2015 г.</a:t>
             </a:fld>
             <a:endParaRPr lang="bg-BG"/>
           </a:p>
@@ -1529,7 +1529,7 @@
           <a:p>
             <a:fld id="{3EA744D9-3FBE-48D8-BF2A-85DF203E4D20}" type="datetimeFigureOut">
               <a:rPr lang="bg-BG" smtClean="0"/>
-              <a:t>5.11.2015 г.</a:t>
+              <a:t>8.11.2015 г.</a:t>
             </a:fld>
             <a:endParaRPr lang="bg-BG"/>
           </a:p>
@@ -1775,7 +1775,7 @@
           <a:p>
             <a:fld id="{3EA744D9-3FBE-48D8-BF2A-85DF203E4D20}" type="datetimeFigureOut">
               <a:rPr lang="bg-BG" smtClean="0"/>
-              <a:t>5.11.2015 г.</a:t>
+              <a:t>8.11.2015 г.</a:t>
             </a:fld>
             <a:endParaRPr lang="bg-BG"/>
           </a:p>
@@ -2063,7 +2063,7 @@
           <a:p>
             <a:fld id="{3EA744D9-3FBE-48D8-BF2A-85DF203E4D20}" type="datetimeFigureOut">
               <a:rPr lang="bg-BG" smtClean="0"/>
-              <a:t>5.11.2015 г.</a:t>
+              <a:t>8.11.2015 г.</a:t>
             </a:fld>
             <a:endParaRPr lang="bg-BG"/>
           </a:p>
@@ -2485,7 +2485,7 @@
           <a:p>
             <a:fld id="{3EA744D9-3FBE-48D8-BF2A-85DF203E4D20}" type="datetimeFigureOut">
               <a:rPr lang="bg-BG" smtClean="0"/>
-              <a:t>5.11.2015 г.</a:t>
+              <a:t>8.11.2015 г.</a:t>
             </a:fld>
             <a:endParaRPr lang="bg-BG"/>
           </a:p>
@@ -2603,7 +2603,7 @@
           <a:p>
             <a:fld id="{3EA744D9-3FBE-48D8-BF2A-85DF203E4D20}" type="datetimeFigureOut">
               <a:rPr lang="bg-BG" smtClean="0"/>
-              <a:t>5.11.2015 г.</a:t>
+              <a:t>8.11.2015 г.</a:t>
             </a:fld>
             <a:endParaRPr lang="bg-BG"/>
           </a:p>
@@ -2698,7 +2698,7 @@
           <a:p>
             <a:fld id="{3EA744D9-3FBE-48D8-BF2A-85DF203E4D20}" type="datetimeFigureOut">
               <a:rPr lang="bg-BG" smtClean="0"/>
-              <a:t>5.11.2015 г.</a:t>
+              <a:t>8.11.2015 г.</a:t>
             </a:fld>
             <a:endParaRPr lang="bg-BG"/>
           </a:p>
@@ -2975,7 +2975,7 @@
           <a:p>
             <a:fld id="{3EA744D9-3FBE-48D8-BF2A-85DF203E4D20}" type="datetimeFigureOut">
               <a:rPr lang="bg-BG" smtClean="0"/>
-              <a:t>5.11.2015 г.</a:t>
+              <a:t>8.11.2015 г.</a:t>
             </a:fld>
             <a:endParaRPr lang="bg-BG"/>
           </a:p>
@@ -3228,7 +3228,7 @@
           <a:p>
             <a:fld id="{3EA744D9-3FBE-48D8-BF2A-85DF203E4D20}" type="datetimeFigureOut">
               <a:rPr lang="bg-BG" smtClean="0"/>
-              <a:t>5.11.2015 г.</a:t>
+              <a:t>8.11.2015 г.</a:t>
             </a:fld>
             <a:endParaRPr lang="bg-BG"/>
           </a:p>
@@ -3450,7 +3450,7 @@
           <a:p>
             <a:fld id="{3EA744D9-3FBE-48D8-BF2A-85DF203E4D20}" type="datetimeFigureOut">
               <a:rPr lang="bg-BG" smtClean="0"/>
-              <a:t>5.11.2015 г.</a:t>
+              <a:t>8.11.2015 г.</a:t>
             </a:fld>
             <a:endParaRPr lang="bg-BG"/>
           </a:p>
@@ -4362,14 +4362,14 @@
               <a:t>ourArray</a:t>
             </a:r>
             <a:r>
-              <a:rPr lang="en-US" dirty="0" smtClean="0">
-                <a:solidFill>
-                  <a:schemeClr val="bg1">
-                    <a:lumMod val="95000"/>
-                  </a:schemeClr>
-                </a:solidFill>
-              </a:rPr>
-              <a:t>[3].</a:t>
+              <a:rPr lang="en-US" smtClean="0">
+                <a:solidFill>
+                  <a:schemeClr val="bg1">
+                    <a:lumMod val="95000"/>
+                  </a:schemeClr>
+                </a:solidFill>
+              </a:rPr>
+              <a:t>[2].</a:t>
             </a:r>
             <a:r>
               <a:rPr lang="en-US" dirty="0">

</xml_diff>